<commit_message>
Add object pooling tutorial
- Setting up the object pooling system
  provided by the Unity engine

- Add resource data
</commit_message>
<xml_diff>
--- a/Assets/Class/Object Pooling/PPT Data/Object Pooling Example.pptx
+++ b/Assets/Class/Object Pooling/PPT Data/Object Pooling Example.pptx
@@ -2,7 +2,7 @@
 <file path=ppt/presentation.xml><?xml version="1.0" encoding="utf-8"?>
 <p:presentation xmlns:a="http://schemas.openxmlformats.org/drawingml/2006/main" xmlns:r="http://schemas.openxmlformats.org/officeDocument/2006/relationships" xmlns:p="http://schemas.openxmlformats.org/presentationml/2006/main" xmlns:p14="http://schemas.microsoft.com/office/powerpoint/2010/main" saveSubsetFonts="1" firstSlideNum="0">
   <p:sldMasterIdLst>
-    <p:sldMasterId id="2147485746" r:id="rId12"/>
+    <p:sldMasterId id="2147485748" r:id="rId12"/>
   </p:sldMasterIdLst>
   <p:notesMasterIdLst>
     <p:notesMasterId r:id="rId14"/>
@@ -6153,7 +6153,7 @@
 </file>
 
 <file path=ppt/slides/slide2.xml><?xml version="1.0" encoding="utf-8"?>
-<p:sld xmlns:a="http://schemas.openxmlformats.org/drawingml/2006/main" xmlns:r="http://schemas.openxmlformats.org/officeDocument/2006/relationships" xmlns:p="http://schemas.openxmlformats.org/presentationml/2006/main">
+<p:sld xmlns:a="http://schemas.openxmlformats.org/drawingml/2006/main" xmlns:r="http://schemas.openxmlformats.org/officeDocument/2006/relationships" xmlns:p="http://schemas.openxmlformats.org/presentationml/2006/main" xmlns:p14="http://schemas.microsoft.com/office/powerpoint/2010/main">
   <p:cSld>
     <p:spTree>
       <p:nvGrpSpPr>
@@ -6221,7 +6221,7 @@
       </p:sp>
       <p:sp>
         <p:nvSpPr>
-          <p:cNvPr id="1109" name="Rect 0"/>
+          <p:cNvPr id="1110" name="텍스트 상자 11"/>
           <p:cNvSpPr txBox="1">
             <a:spLocks/>
           </p:cNvSpPr>
@@ -6229,8 +6229,8 @@
         </p:nvSpPr>
         <p:spPr>
           <a:xfrm rot="0">
-            <a:off x="6810375" y="4264025"/>
-            <a:ext cx="4272915" cy="1754505"/>
+            <a:off x="1355090" y="1569085"/>
+            <a:ext cx="4015740" cy="2308225"/>
           </a:xfrm>
           <a:prstGeom prst="rect"/>
           <a:noFill/>
@@ -6254,14 +6254,7 @@
                 <a:latin typeface="맑은 고딕" charset="0"/>
                 <a:ea typeface="맑은 고딕" charset="0"/>
               </a:rPr>
-              <a:t>반복문을 사용하여 일정한 범위의 수만큼 게임 오브젝트 생성합니다</a:t>
-            </a:r>
-            <a:r>
-              <a:rPr lang="ko-KR" sz="1800">
-                <a:latin typeface="맑은 고딕" charset="0"/>
-                <a:ea typeface="맑은 고딕" charset="0"/>
-              </a:rPr>
-              <a:t>.</a:t>
+              <a:t>Object Pool이란?</a:t>
             </a:r>
             <a:endParaRPr lang="ko-KR" altLang="en-US" sz="1800">
               <a:latin typeface="맑은 고딕" charset="0"/>
@@ -6273,6 +6266,13 @@
               <a:buFontTx/>
               <a:buNone/>
             </a:pPr>
+            <a:r>
+              <a:rPr lang="ko-KR" sz="1800">
+                <a:latin typeface="맑은 고딕" charset="0"/>
+                <a:ea typeface="맑은 고딕" charset="0"/>
+              </a:rPr>
+              <a:t>게임 오브젝트를 생성하고 파괴하는 것이 아니라 일정한 범위의 메모리 공간을 설정합니다.</a:t>
+            </a:r>
             <a:endParaRPr lang="ko-KR" altLang="en-US" sz="1800">
               <a:latin typeface="맑은 고딕" charset="0"/>
               <a:ea typeface="맑은 고딕" charset="0"/>
@@ -6283,45 +6283,11 @@
               <a:buFontTx/>
               <a:buNone/>
             </a:pPr>
-            <a:r>
-              <a:rPr lang="ko-KR" sz="1800">
-                <a:latin typeface="맑은 고딕" charset="0"/>
-                <a:ea typeface="맑은 고딕" charset="0"/>
-              </a:rPr>
-              <a:t>그리고 위치와 회전 값을 설정하고 Queue에 저장한 다음 Queue에 저장한 게임 오브젝트 전체를 비활성화합니다.</a:t>
-            </a:r>
             <a:endParaRPr lang="ko-KR" altLang="en-US" sz="1800">
               <a:latin typeface="맑은 고딕" charset="0"/>
               <a:ea typeface="맑은 고딕" charset="0"/>
             </a:endParaRPr>
           </a:p>
-        </p:txBody>
-      </p:sp>
-      <p:sp>
-        <p:nvSpPr>
-          <p:cNvPr id="1110" name="텍스트 상자 11"/>
-          <p:cNvSpPr txBox="1">
-            <a:spLocks/>
-          </p:cNvSpPr>
-          <p:nvPr/>
-        </p:nvSpPr>
-        <p:spPr>
-          <a:xfrm rot="0">
-            <a:off x="1355090" y="1569085"/>
-            <a:ext cx="4015740" cy="2308225"/>
-          </a:xfrm>
-          <a:prstGeom prst="rect"/>
-          <a:noFill/>
-          <a:ln w="0">
-            <a:noFill/>
-            <a:prstDash/>
-          </a:ln>
-        </p:spPr>
-        <p:txBody>
-          <a:bodyPr wrap="square" lIns="89535" tIns="46355" rIns="89535" bIns="46355" numCol="1" vert="horz" anchor="t">
-            <a:spAutoFit/>
-          </a:bodyPr>
-          <a:lstStyle/>
           <a:p>
             <a:pPr marL="0" indent="0" algn="l" latinLnBrk="0" hangingPunct="1">
               <a:buFontTx/>
@@ -6332,62 +6298,18 @@
                 <a:latin typeface="맑은 고딕" charset="0"/>
                 <a:ea typeface="맑은 고딕" charset="0"/>
               </a:rPr>
-              <a:t>Object Pool이란?</a:t>
+              <a:t>그리고 일정한 범위가 정해져 있는 메모리 공간 안에서 게임 오브젝트를 사용하고 반납하는 기법입니다.</a:t>
             </a:r>
             <a:endParaRPr lang="ko-KR" altLang="en-US" sz="1800">
               <a:latin typeface="맑은 고딕" charset="0"/>
               <a:ea typeface="맑은 고딕" charset="0"/>
             </a:endParaRPr>
           </a:p>
-          <a:p>
-            <a:pPr marL="0" indent="0" algn="l" latinLnBrk="0" hangingPunct="1">
-              <a:buFontTx/>
-              <a:buNone/>
-            </a:pPr>
-            <a:r>
-              <a:rPr lang="ko-KR" sz="1800">
-                <a:latin typeface="맑은 고딕" charset="0"/>
-                <a:ea typeface="맑은 고딕" charset="0"/>
-              </a:rPr>
-              <a:t>게임 오브젝트를 생성하고 파괴하는 것이 아니라 일정한 범위의 메모리 공간을 설정합니다.</a:t>
-            </a:r>
-            <a:endParaRPr lang="ko-KR" altLang="en-US" sz="1800">
-              <a:latin typeface="맑은 고딕" charset="0"/>
-              <a:ea typeface="맑은 고딕" charset="0"/>
-            </a:endParaRPr>
-          </a:p>
-          <a:p>
-            <a:pPr marL="0" indent="0" algn="l" latinLnBrk="0" hangingPunct="1">
-              <a:buFontTx/>
-              <a:buNone/>
-            </a:pPr>
-            <a:endParaRPr lang="ko-KR" altLang="en-US" sz="1800">
-              <a:latin typeface="맑은 고딕" charset="0"/>
-              <a:ea typeface="맑은 고딕" charset="0"/>
-            </a:endParaRPr>
-          </a:p>
-          <a:p>
-            <a:pPr marL="0" indent="0" algn="l" latinLnBrk="0" hangingPunct="1">
-              <a:buFontTx/>
-              <a:buNone/>
-            </a:pPr>
-            <a:r>
-              <a:rPr lang="ko-KR" sz="1800">
-                <a:latin typeface="맑은 고딕" charset="0"/>
-                <a:ea typeface="맑은 고딕" charset="0"/>
-              </a:rPr>
-              <a:t>그리고 일정한 범위가 정해져 있는 메모리 공간 안에서 게임 오브젝트를 사용하고 반납하는 기법입니다.</a:t>
-            </a:r>
-            <a:endParaRPr lang="ko-KR" altLang="en-US" sz="1800">
-              <a:latin typeface="맑은 고딕" charset="0"/>
-              <a:ea typeface="맑은 고딕" charset="0"/>
-            </a:endParaRPr>
-          </a:p>
         </p:txBody>
       </p:sp>
       <p:pic>
         <p:nvPicPr>
-          <p:cNvPr id="1112" name="그림 24" descr="C:/Users/Admin1/AppData/Roaming/PolarisOffice/ETemp/2224_21539392/fImage1021853036500.png"/>
+          <p:cNvPr id="1112" name="그림 24"/>
           <p:cNvPicPr>
             <a:picLocks noChangeAspect="1"/>
           </p:cNvPicPr>
@@ -6416,7 +6338,7 @@
       </p:pic>
       <p:pic>
         <p:nvPicPr>
-          <p:cNvPr id="1113" name="그림 25" descr="C:/Users/Admin1/AppData/Roaming/PolarisOffice/ETemp/2224_21539392/fImage3728823049169.png"/>
+          <p:cNvPr id="1113" name="그림 25"/>
           <p:cNvPicPr>
             <a:picLocks noChangeAspect="1"/>
           </p:cNvPicPr>
@@ -6445,7 +6367,7 @@
       </p:pic>
       <p:pic>
         <p:nvPicPr>
-          <p:cNvPr id="1114" name="그림 26" descr="C:/Users/Admin1/AppData/Roaming/PolarisOffice/ETemp/2224_21539392/fImage3728823055724.png"/>
+          <p:cNvPr id="1114" name="그림 26"/>
           <p:cNvPicPr>
             <a:picLocks noChangeAspect="1"/>
           </p:cNvPicPr>
@@ -6474,7 +6396,7 @@
       </p:pic>
       <p:pic>
         <p:nvPicPr>
-          <p:cNvPr id="1115" name="그림 27" descr="C:/Users/Admin1/AppData/Roaming/PolarisOffice/ETemp/2224_21539392/fImage3728823061478.png"/>
+          <p:cNvPr id="1115" name="그림 27"/>
           <p:cNvPicPr>
             <a:picLocks noChangeAspect="1"/>
           </p:cNvPicPr>
@@ -6503,7 +6425,7 @@
       </p:pic>
       <p:pic>
         <p:nvPicPr>
-          <p:cNvPr id="1116" name="그림 28" descr="C:/Users/Admin1/AppData/Roaming/PolarisOffice/ETemp/2224_21539392/fImage3728823079358.png"/>
+          <p:cNvPr id="1116" name="그림 28"/>
           <p:cNvPicPr>
             <a:picLocks noChangeAspect="1"/>
           </p:cNvPicPr>
@@ -6577,7 +6499,7 @@
       </p:sp>
       <p:pic>
         <p:nvPicPr>
-          <p:cNvPr id="1118" name="그림 30" descr="C:/Users/Admin1/AppData/Roaming/PolarisOffice/ETemp/2224_21539392/fImage3728823096962.png"/>
+          <p:cNvPr id="1118" name="그림 30"/>
           <p:cNvPicPr>
             <a:picLocks noChangeAspect="1"/>
           </p:cNvPicPr>
@@ -6606,7 +6528,7 @@
       </p:pic>
       <p:pic>
         <p:nvPicPr>
-          <p:cNvPr id="1119" name="그림 31" descr="C:/Users/Admin1/AppData/Roaming/PolarisOffice/ETemp/2224_21539392/fImage3728823104464.png"/>
+          <p:cNvPr id="1119" name="그림 31"/>
           <p:cNvPicPr>
             <a:picLocks noChangeAspect="1"/>
           </p:cNvPicPr>
@@ -6635,7 +6557,7 @@
       </p:pic>
       <p:pic>
         <p:nvPicPr>
-          <p:cNvPr id="1120" name="그림 32" descr="C:/Users/Admin1/AppData/Roaming/PolarisOffice/ETemp/2224_21539392/fImage3728823115705.png"/>
+          <p:cNvPr id="1120" name="그림 32"/>
           <p:cNvPicPr>
             <a:picLocks noChangeAspect="1"/>
           </p:cNvPicPr>
@@ -6707,35 +6629,6 @@
           </a:p>
         </p:txBody>
       </p:sp>
-      <p:pic>
-        <p:nvPicPr>
-          <p:cNvPr id="1122" name="그림 77" descr="C:/Users/Admin1/AppData/Roaming/PolarisOffice/ETemp/2224_21539392/fImage108673798145.png"/>
-          <p:cNvPicPr>
-            <a:picLocks noChangeAspect="1"/>
-          </p:cNvPicPr>
-          <p:nvPr/>
-        </p:nvPicPr>
-        <p:blipFill rotWithShape="1">
-          <a:blip r:embed="rId10" cstate="print">
-            <a:extLst>
-              <a:ext uri="{28A0092B-C50C-407E-A947-70E740481C1C}">
-                <a14:useLocalDpi xmlns:a14="http://schemas.microsoft.com/office/drawing/2010/main" val="0"/>
-              </a:ext>
-            </a:extLst>
-          </a:blip>
-          <a:stretch>
-            <a:fillRect/>
-          </a:stretch>
-        </p:blipFill>
-        <p:spPr>
-          <a:xfrm rot="0">
-            <a:off x="6819900" y="1490345"/>
-            <a:ext cx="4272280" cy="2653665"/>
-          </a:xfrm>
-          <a:prstGeom prst="rect"/>
-          <a:noFill/>
-        </p:spPr>
-      </p:pic>
     </p:spTree>
   </p:cSld>
   <p:clrMapOvr>

</xml_diff>

<commit_message>
Add Button Function Using Script
- Update object pooling PPT
  Data

- Add new tag to game object

- When creating a game object, set
  Clone to not be created

- Adding and deleting resource data
</commit_message>
<xml_diff>
--- a/Assets/Class/Object Pooling/PPT Data/Object Pooling Example.pptx
+++ b/Assets/Class/Object Pooling/PPT Data/Object Pooling Example.pptx
@@ -2,14 +2,14 @@
 <file path=ppt/presentation.xml><?xml version="1.0" encoding="utf-8"?>
 <p:presentation xmlns:a="http://schemas.openxmlformats.org/drawingml/2006/main" xmlns:r="http://schemas.openxmlformats.org/officeDocument/2006/relationships" xmlns:p="http://schemas.openxmlformats.org/presentationml/2006/main" xmlns:p14="http://schemas.microsoft.com/office/powerpoint/2010/main" saveSubsetFonts="1" firstSlideNum="0">
   <p:sldMasterIdLst>
-    <p:sldMasterId id="2147485748" r:id="rId12"/>
+    <p:sldMasterId id="2147485755" r:id="rId12"/>
   </p:sldMasterIdLst>
   <p:notesMasterIdLst>
     <p:notesMasterId r:id="rId14"/>
   </p:notesMasterIdLst>
   <p:sldIdLst>
     <p:sldId id="293" r:id="rId16"/>
-    <p:sldId id="302" r:id="rId18"/>
+    <p:sldId id="302" r:id="rId17"/>
   </p:sldIdLst>
   <p:sldSz cx="12192000" cy="6858000"/>
   <p:notesSz cx="6858000" cy="9144000"/>
@@ -5754,8 +5754,8 @@
         </p:nvSpPr>
         <p:spPr>
           <a:xfrm rot="0">
-            <a:off x="6863715" y="4577715"/>
-            <a:ext cx="4442460" cy="1508125"/>
+            <a:off x="6855460" y="2673350"/>
+            <a:ext cx="4093210" cy="677545"/>
           </a:xfrm>
           <a:prstGeom prst="rect"/>
           <a:noFill/>
@@ -5799,101 +5799,25 @@
                 <a:latin typeface="맑은 고딕" charset="0"/>
                 <a:ea typeface="맑은 고딕" charset="0"/>
               </a:rPr>
-              <a:t>그다음</a:t>
+              <a:t>그다음 </a:t>
             </a:r>
             <a:r>
               <a:rPr lang="ko-KR" sz="1800">
                 <a:latin typeface="맑은 고딕" charset="0"/>
                 <a:ea typeface="맑은 고딕" charset="0"/>
               </a:rPr>
-              <a:t> </a:t>
-            </a:r>
-            <a:r>
-              <a:rPr lang="ko-KR" sz="1800">
-                <a:latin typeface="맑은 고딕" charset="0"/>
-                <a:ea typeface="맑은 고딕" charset="0"/>
-              </a:rPr>
-              <a:t>Window에서</a:t>
-            </a:r>
-            <a:r>
-              <a:rPr lang="ko-KR" sz="1800">
-                <a:latin typeface="맑은 고딕" charset="0"/>
-                <a:ea typeface="맑은 고딕" charset="0"/>
-              </a:rPr>
-              <a:t> </a:t>
-            </a:r>
-            <a:r>
-              <a:rPr lang="ko-KR" sz="1800">
-                <a:latin typeface="맑은 고딕" charset="0"/>
-                <a:ea typeface="맑은 고딕" charset="0"/>
-              </a:rPr>
-              <a:t>Asset</a:t>
-            </a:r>
-            <a:r>
-              <a:rPr lang="ko-KR" sz="1800">
-                <a:latin typeface="맑은 고딕" charset="0"/>
-                <a:ea typeface="맑은 고딕" charset="0"/>
-              </a:rPr>
-              <a:t> </a:t>
-            </a:r>
-            <a:r>
-              <a:rPr lang="ko-KR" sz="1800">
-                <a:latin typeface="맑은 고딕" charset="0"/>
-                <a:ea typeface="맑은 고딕" charset="0"/>
-              </a:rPr>
-              <a:t>Store를</a:t>
-            </a:r>
-            <a:r>
-              <a:rPr lang="ko-KR" sz="1800">
-                <a:latin typeface="맑은 고딕" charset="0"/>
-                <a:ea typeface="맑은 고딕" charset="0"/>
-              </a:rPr>
-              <a:t> </a:t>
-            </a:r>
-            <a:r>
-              <a:rPr lang="ko-KR" sz="1800">
-                <a:latin typeface="맑은 고딕" charset="0"/>
-                <a:ea typeface="맑은 고딕" charset="0"/>
-              </a:rPr>
-              <a:t>선택합니다. </a:t>
+              <a:t>Main Camera 오브젝트의 위치와 회전 값을 설정합니다.</a:t>
             </a:r>
             <a:endParaRPr lang="ko-KR" altLang="en-US" sz="1800">
               <a:latin typeface="맑은 고딕" charset="0"/>
               <a:ea typeface="맑은 고딕" charset="0"/>
             </a:endParaRPr>
           </a:p>
-          <a:p>
-            <a:pPr marL="0" indent="0" algn="l" latinLnBrk="0" hangingPunct="1">
-              <a:buFontTx/>
-              <a:buNone/>
-            </a:pPr>
-            <a:endParaRPr lang="ko-KR" altLang="en-US" sz="1800">
-              <a:latin typeface="맑은 고딕" charset="0"/>
-              <a:ea typeface="맑은 고딕" charset="0"/>
-            </a:endParaRPr>
-          </a:p>
-          <a:p>
-            <a:pPr marL="0" indent="0" algn="l" latinLnBrk="0" hangingPunct="1">
-              <a:buFontTx/>
-              <a:buNone/>
-            </a:pPr>
-            <a:r>
-              <a:rPr lang="ko-KR" sz="1800">
-                <a:latin typeface="맑은 고딕" charset="0"/>
-                <a:ea typeface="맑은 고딕" charset="0"/>
-              </a:rPr>
-              <a:t>그리고 Asset Store에서 Stones를 검색하고 Stones 에셋을 선택합니다.</a:t>
-            </a:r>
-            <a:endParaRPr lang="ko-KR" altLang="en-US" sz="1800">
-              <a:latin typeface="맑은 고딕" charset="0"/>
-              <a:ea typeface="맑은 고딕" charset="0"/>
-            </a:endParaRPr>
-          </a:p>
         </p:txBody>
       </p:sp>
       <p:pic>
         <p:nvPicPr>
-          <p:cNvPr id="1042" name="그림 58"/>
+          <p:cNvPr id="1042" name="그림 58" descr="C:/Users/Admin1/AppData/Roaming/PolarisOffice/ETemp/4220_21810040/fImage850627641.png"/>
           <p:cNvPicPr>
             <a:picLocks noChangeAspect="1"/>
           </p:cNvPicPr>
@@ -5914,7 +5838,7 @@
         <p:spPr>
           <a:xfrm rot="0">
             <a:off x="1472565" y="1279525"/>
-            <a:ext cx="2036445" cy="2835910"/>
+            <a:ext cx="2211070" cy="2428875"/>
           </a:xfrm>
           <a:prstGeom prst="roundRect"/>
           <a:solidFill>
@@ -5932,8 +5856,8 @@
         </p:nvSpPr>
         <p:spPr>
           <a:xfrm rot="0">
-            <a:off x="1465580" y="4300220"/>
-            <a:ext cx="3888740" cy="1784985"/>
+            <a:off x="1473835" y="3850640"/>
+            <a:ext cx="3889375" cy="2338705"/>
           </a:xfrm>
           <a:prstGeom prst="rect"/>
           <a:noFill/>
@@ -5967,7 +5891,21 @@
                 <a:latin typeface="맑은 고딕" charset="0"/>
                 <a:ea typeface="맑은 고딕" charset="0"/>
               </a:rPr>
-              <a:t>빈 게임 오브젝트를 생성하고 이름을 Create Object로 정의합니다. </a:t>
+              <a:t>빈 게임 오브젝트를 생성하고 이름을 </a:t>
+            </a:r>
+            <a:r>
+              <a:rPr lang="ko-KR" sz="1800">
+                <a:latin typeface="맑은 고딕" charset="0"/>
+                <a:ea typeface="맑은 고딕" charset="0"/>
+              </a:rPr>
+              <a:t>Object Pool Manager</a:t>
+            </a:r>
+            <a:r>
+              <a:rPr lang="ko-KR" sz="1800">
+                <a:latin typeface="맑은 고딕" charset="0"/>
+                <a:ea typeface="맑은 고딕" charset="0"/>
+              </a:rPr>
+              <a:t>로 정의합니다. </a:t>
             </a:r>
             <a:endParaRPr lang="ko-KR" altLang="en-US" sz="1800">
               <a:latin typeface="맑은 고딕" charset="0"/>
@@ -5994,7 +5932,35 @@
                 <a:latin typeface="맑은 고딕" charset="0"/>
                 <a:ea typeface="맑은 고딕" charset="0"/>
               </a:rPr>
-              <a:t>그리고 스크립트를 생성하고 Create라는 이름으로 설정하고 Create Object에 넣어줍니다.</a:t>
+              <a:t>그리고 스크립트를 생성하고 </a:t>
+            </a:r>
+            <a:r>
+              <a:rPr lang="ko-KR" sz="1800">
+                <a:latin typeface="맑은 고딕" charset="0"/>
+                <a:ea typeface="맑은 고딕" charset="0"/>
+              </a:rPr>
+              <a:t>ObjectPoolManager</a:t>
+            </a:r>
+            <a:r>
+              <a:rPr lang="ko-KR" sz="1800">
+                <a:latin typeface="맑은 고딕" charset="0"/>
+                <a:ea typeface="맑은 고딕" charset="0"/>
+              </a:rPr>
+              <a:t>라는 이름으로 설정하고 </a:t>
+            </a:r>
+            <a:r>
+              <a:rPr lang="ko-KR" sz="1800">
+                <a:latin typeface="맑은 고딕" charset="0"/>
+                <a:ea typeface="맑은 고딕" charset="0"/>
+              </a:rPr>
+              <a:t>Object Pool Manager 오브젝트</a:t>
+            </a:r>
+            <a:r>
+              <a:rPr lang="ko-KR" sz="1800">
+                <a:latin typeface="맑은 고딕" charset="0"/>
+                <a:ea typeface="맑은 고딕" charset="0"/>
+              </a:rPr>
+              <a:t>에 넣어줍니다.</a:t>
             </a:r>
             <a:endParaRPr lang="ko-KR" altLang="en-US" sz="1800">
               <a:latin typeface="맑은 고딕" charset="0"/>
@@ -6005,17 +5971,17 @@
       </p:sp>
       <p:pic>
         <p:nvPicPr>
-          <p:cNvPr id="1045" name="그림 65" descr="C:/Users/Admin1/AppData/Roaming/PolarisOffice/ETemp/16684_11126392/fImage28282796334.png"/>
+          <p:cNvPr id="1049" name="그림 1" descr="C:/Users/Admin1/AppData/Roaming/PolarisOffice/ETemp/4220_21810040/fImage50875641.png"/>
           <p:cNvPicPr>
             <a:picLocks noChangeAspect="1"/>
           </p:cNvPicPr>
           <p:nvPr/>
         </p:nvPicPr>
         <p:blipFill rotWithShape="1">
-          <a:blip r:embed="rId4" cstate="hqprint">
+          <a:blip r:embed="rId9" cstate="print">
             <a:extLst>
               <a:ext uri="{28A0092B-C50C-407E-A947-70E740481C1C}">
-                <a14:useLocalDpi xmlns:a14="http://schemas.microsoft.com/office/drawing/2010/main"/>
+                <a14:useLocalDpi xmlns:a14="http://schemas.microsoft.com/office/drawing/2010/main" val="0"/>
               </a:ext>
             </a:extLst>
           </a:blip>
@@ -6025,8 +5991,8 @@
         </p:blipFill>
         <p:spPr>
           <a:xfrm rot="0">
-            <a:off x="4198620" y="3383280"/>
-            <a:ext cx="682625" cy="740410"/>
+            <a:off x="3874135" y="1282065"/>
+            <a:ext cx="1488440" cy="1303655"/>
           </a:xfrm>
           <a:prstGeom prst="roundRect"/>
           <a:solidFill>
@@ -6034,23 +6000,55 @@
           </a:solidFill>
         </p:spPr>
       </p:pic>
+      <p:pic>
+        <p:nvPicPr>
+          <p:cNvPr id="1050" name="그림 4" descr="C:/Users/Admin1/AppData/Roaming/PolarisOffice/ETemp/4220_21810040/fImage2360578467.png"/>
+          <p:cNvPicPr>
+            <a:picLocks noChangeAspect="1"/>
+          </p:cNvPicPr>
+          <p:nvPr/>
+        </p:nvPicPr>
+        <p:blipFill rotWithShape="1">
+          <a:blip r:embed="rId10" cstate="print">
+            <a:extLst>
+              <a:ext uri="{28A0092B-C50C-407E-A947-70E740481C1C}">
+                <a14:useLocalDpi xmlns:a14="http://schemas.microsoft.com/office/drawing/2010/main" val="0"/>
+              </a:ext>
+            </a:extLst>
+          </a:blip>
+          <a:stretch>
+            <a:fillRect/>
+          </a:stretch>
+        </p:blipFill>
+        <p:spPr>
+          <a:xfrm rot="0">
+            <a:off x="4239895" y="2899410"/>
+            <a:ext cx="765175" cy="810260"/>
+          </a:xfrm>
+          <a:prstGeom prst="roundRect"/>
+          <a:solidFill>
+            <a:srgbClr val="EDEDED"/>
+          </a:solidFill>
+        </p:spPr>
+      </p:pic>
       <p:cxnSp>
         <p:nvCxnSpPr>
-          <p:cNvPr id="1046" name="도형 68"/>
+          <p:cNvPr id="1051" name="도형 7"/>
           <p:cNvCxnSpPr>
-            <a:stCxn id="1045" idx="0"/>
+            <a:stCxn id="1050" idx="0"/>
             <a:endCxn id="1049" idx="2"/>
           </p:cNvCxnSpPr>
           <p:nvPr/>
         </p:nvCxnSpPr>
         <p:spPr>
-          <a:xfrm rot="0" flipV="1">
-            <a:off x="4539615" y="2950845"/>
-            <a:ext cx="2540" cy="433070"/>
+          <a:xfrm rot="0" flipH="1" flipV="1">
+            <a:off x="4617720" y="2585085"/>
+            <a:ext cx="5080" cy="314960"/>
           </a:xfrm>
           <a:prstGeom prst="straightConnector1"/>
           <a:ln w="6350" cap="flat" cmpd="sng">
             <a:prstDash/>
+            <a:headEnd type="none" w="med" len="med"/>
             <a:tailEnd type="triangle" w="med" len="med"/>
           </a:ln>
         </p:spPr>
@@ -6071,43 +6069,14 @@
       </p:cxnSp>
       <p:pic>
         <p:nvPicPr>
-          <p:cNvPr id="1048" name="그림 71" descr="C:/Users/Admin1/AppData/Roaming/PolarisOffice/ETemp/16684_11126392/fImage4331572829169.png"/>
+          <p:cNvPr id="1052" name="그림 8" descr="C:/Users/Admin1/AppData/Roaming/PolarisOffice/ETemp/4220_21810040/fImage12218596334.png"/>
           <p:cNvPicPr>
             <a:picLocks noChangeAspect="1"/>
           </p:cNvPicPr>
           <p:nvPr/>
         </p:nvPicPr>
         <p:blipFill rotWithShape="1">
-          <a:blip r:embed="rId6" cstate="hqprint">
-            <a:extLst>
-              <a:ext uri="{28A0092B-C50C-407E-A947-70E740481C1C}">
-                <a14:useLocalDpi xmlns:a14="http://schemas.microsoft.com/office/drawing/2010/main"/>
-              </a:ext>
-            </a:extLst>
-          </a:blip>
-          <a:stretch>
-            <a:fillRect/>
-          </a:stretch>
-        </p:blipFill>
-        <p:spPr>
-          <a:xfrm rot="0">
-            <a:off x="6866890" y="1280160"/>
-            <a:ext cx="4431665" cy="3143885"/>
-          </a:xfrm>
-          <a:prstGeom prst="rect"/>
-          <a:noFill/>
-        </p:spPr>
-      </p:pic>
-      <p:pic>
-        <p:nvPicPr>
-          <p:cNvPr id="1049" name="그림 1" descr="C:/Users/Admin1/AppData/Roaming/PolarisOffice/ETemp/16684_11126392/fImage453129141.png"/>
-          <p:cNvPicPr>
-            <a:picLocks noChangeAspect="1"/>
-          </p:cNvPicPr>
-          <p:nvPr/>
-        </p:nvPicPr>
-        <p:blipFill rotWithShape="1">
-          <a:blip r:embed="rId8" cstate="print">
+          <a:blip r:embed="rId11" cstate="print">
             <a:extLst>
               <a:ext uri="{28A0092B-C50C-407E-A947-70E740481C1C}">
                 <a14:useLocalDpi xmlns:a14="http://schemas.microsoft.com/office/drawing/2010/main" val="0"/>
@@ -6120,8 +6089,8 @@
         </p:blipFill>
         <p:spPr>
           <a:xfrm rot="0">
-            <a:off x="3769995" y="1278890"/>
-            <a:ext cx="1543685" cy="1672590"/>
+            <a:off x="6862445" y="1273810"/>
+            <a:ext cx="4086225" cy="1320165"/>
           </a:xfrm>
           <a:prstGeom prst="roundRect"/>
           <a:solidFill>
@@ -6229,8 +6198,8 @@
         </p:nvSpPr>
         <p:spPr>
           <a:xfrm rot="0">
-            <a:off x="1355090" y="1569085"/>
-            <a:ext cx="4015740" cy="2308225"/>
+            <a:off x="1222375" y="1461135"/>
+            <a:ext cx="4157345" cy="4799965"/>
           </a:xfrm>
           <a:prstGeom prst="rect"/>
           <a:noFill/>
@@ -6271,7 +6240,7 @@
                 <a:latin typeface="맑은 고딕" charset="0"/>
                 <a:ea typeface="맑은 고딕" charset="0"/>
               </a:rPr>
-              <a:t>게임 오브젝트를 생성하고 파괴하는 것이 아니라 일정한 범위의 메모리 공간을 설정합니다.</a:t>
+              <a:t>미리 특정한 메모리 크기를 설정하고 게임 오브젝트 생성 및 파괴 시 확보된 공간을 사용하고 회수하는 기법입니다.</a:t>
             </a:r>
             <a:endParaRPr lang="ko-KR" altLang="en-US" sz="1800">
               <a:latin typeface="맑은 고딕" charset="0"/>
@@ -6293,30 +6262,110 @@
               <a:buFontTx/>
               <a:buNone/>
             </a:pPr>
-            <a:r>
-              <a:rPr lang="ko-KR" sz="1800">
-                <a:latin typeface="맑은 고딕" charset="0"/>
-                <a:ea typeface="맑은 고딕" charset="0"/>
-              </a:rPr>
-              <a:t>그리고 일정한 범위가 정해져 있는 메모리 공간 안에서 게임 오브젝트를 사용하고 반납하는 기법입니다.</a:t>
-            </a:r>
             <a:endParaRPr lang="ko-KR" altLang="en-US" sz="1800">
               <a:latin typeface="맑은 고딕" charset="0"/>
               <a:ea typeface="맑은 고딕" charset="0"/>
             </a:endParaRPr>
           </a:p>
+          <a:p>
+            <a:pPr marL="0" indent="0" algn="l" latinLnBrk="0" hangingPunct="1">
+              <a:buFontTx/>
+              <a:buNone/>
+            </a:pPr>
+            <a:endParaRPr lang="ko-KR" altLang="en-US" sz="1800">
+              <a:latin typeface="맑은 고딕" charset="0"/>
+              <a:ea typeface="맑은 고딕" charset="0"/>
+            </a:endParaRPr>
+          </a:p>
+          <a:p>
+            <a:pPr marL="0" indent="0" algn="l" latinLnBrk="0" hangingPunct="1">
+              <a:buFontTx/>
+              <a:buNone/>
+            </a:pPr>
+            <a:endParaRPr lang="ko-KR" altLang="en-US" sz="1800">
+              <a:latin typeface="맑은 고딕" charset="0"/>
+              <a:ea typeface="맑은 고딕" charset="0"/>
+            </a:endParaRPr>
+          </a:p>
+          <a:p>
+            <a:pPr marL="0" indent="0" algn="l" latinLnBrk="0" hangingPunct="1">
+              <a:buFontTx/>
+              <a:buNone/>
+            </a:pPr>
+            <a:endParaRPr lang="ko-KR" altLang="en-US" sz="1800">
+              <a:latin typeface="맑은 고딕" charset="0"/>
+              <a:ea typeface="맑은 고딕" charset="0"/>
+            </a:endParaRPr>
+          </a:p>
+          <a:p>
+            <a:pPr marL="0" indent="0" algn="l" latinLnBrk="0" hangingPunct="1">
+              <a:buFontTx/>
+              <a:buNone/>
+            </a:pPr>
+            <a:endParaRPr lang="ko-KR" altLang="en-US" sz="1800">
+              <a:latin typeface="맑은 고딕" charset="0"/>
+              <a:ea typeface="맑은 고딕" charset="0"/>
+            </a:endParaRPr>
+          </a:p>
+          <a:p>
+            <a:pPr marL="0" indent="0" algn="l" latinLnBrk="0" hangingPunct="1">
+              <a:buFontTx/>
+              <a:buNone/>
+            </a:pPr>
+            <a:endParaRPr lang="ko-KR" altLang="en-US" sz="1800">
+              <a:latin typeface="맑은 고딕" charset="0"/>
+              <a:ea typeface="맑은 고딕" charset="0"/>
+            </a:endParaRPr>
+          </a:p>
+          <a:p>
+            <a:pPr marL="0" indent="0" algn="l" latinLnBrk="0" hangingPunct="1">
+              <a:buFontTx/>
+              <a:buNone/>
+            </a:pPr>
+            <a:endParaRPr lang="ko-KR" altLang="en-US" sz="1800">
+              <a:latin typeface="맑은 고딕" charset="0"/>
+              <a:ea typeface="맑은 고딕" charset="0"/>
+            </a:endParaRPr>
+          </a:p>
+          <a:p>
+            <a:pPr marL="0" indent="0" algn="l" latinLnBrk="0" hangingPunct="1">
+              <a:buFontTx/>
+              <a:buNone/>
+            </a:pPr>
+            <a:endParaRPr lang="ko-KR" altLang="en-US" sz="1800">
+              <a:latin typeface="맑은 고딕" charset="0"/>
+              <a:ea typeface="맑은 고딕" charset="0"/>
+            </a:endParaRPr>
+          </a:p>
+          <a:p>
+            <a:pPr marL="0" indent="0" algn="l" latinLnBrk="0" hangingPunct="1">
+              <a:buFontTx/>
+              <a:buNone/>
+            </a:pPr>
+            <a:r>
+              <a:rPr lang="ko-KR" sz="1800">
+                <a:latin typeface="맑은 고딕" charset="0"/>
+                <a:ea typeface="맑은 고딕" charset="0"/>
+              </a:rPr>
+              <a:t>게임 오브젝트를 생성하고 파괴하는 과정을 반복하다 보면 메모리에 저장할 공간이 있어도 저장할 수 없는 메모리 단편화 현상이 발생할 수 있습니다.</a:t>
+            </a:r>
+            <a:endParaRPr lang="ko-KR" altLang="en-US" sz="1800">
+              <a:latin typeface="맑은 고딕" charset="0"/>
+              <a:ea typeface="맑은 고딕" charset="0"/>
+            </a:endParaRPr>
+          </a:p>
         </p:txBody>
       </p:sp>
       <p:pic>
         <p:nvPicPr>
-          <p:cNvPr id="1112" name="그림 24"/>
+          <p:cNvPr id="1111" name="그림 11" descr="C:/Users/Admin1/AppData/Roaming/PolarisOffice/ETemp/4220_21810040/fImage405330606500.png"/>
           <p:cNvPicPr>
             <a:picLocks noChangeAspect="1"/>
           </p:cNvPicPr>
           <p:nvPr/>
         </p:nvPicPr>
         <p:blipFill rotWithShape="1">
-          <a:blip r:embed="rId2" cstate="print">
+          <a:blip r:embed="rId12" cstate="print">
             <a:extLst>
               <a:ext uri="{28A0092B-C50C-407E-A947-70E740481C1C}">
                 <a14:useLocalDpi xmlns:a14="http://schemas.microsoft.com/office/drawing/2010/main" val="0"/>
@@ -6329,23 +6378,25 @@
         </p:blipFill>
         <p:spPr>
           <a:xfrm rot="0">
-            <a:off x="1363345" y="4106545"/>
-            <a:ext cx="1297305" cy="1654810"/>
-          </a:xfrm>
-          <a:prstGeom prst="rect"/>
-          <a:noFill/>
+            <a:off x="6808470" y="1471295"/>
+            <a:ext cx="4140200" cy="2918460"/>
+          </a:xfrm>
+          <a:prstGeom prst="roundRect"/>
+          <a:solidFill>
+            <a:srgbClr val="EDEDED"/>
+          </a:solidFill>
         </p:spPr>
       </p:pic>
       <p:pic>
         <p:nvPicPr>
-          <p:cNvPr id="1113" name="그림 25"/>
+          <p:cNvPr id="1112" name="그림 20" descr="C:/Users/Admin1/AppData/Roaming/PolarisOffice/ETemp/4220_21810040/fImage141634639169.png"/>
           <p:cNvPicPr>
             <a:picLocks noChangeAspect="1"/>
           </p:cNvPicPr>
           <p:nvPr/>
         </p:nvPicPr>
         <p:blipFill rotWithShape="1">
-          <a:blip r:embed="rId3" cstate="print">
+          <a:blip r:embed="rId13" cstate="print">
             <a:extLst>
               <a:ext uri="{28A0092B-C50C-407E-A947-70E740481C1C}">
                 <a14:useLocalDpi xmlns:a14="http://schemas.microsoft.com/office/drawing/2010/main" val="0"/>
@@ -6358,277 +6409,15 @@
         </p:blipFill>
         <p:spPr>
           <a:xfrm rot="0">
-            <a:off x="1486535" y="4679950"/>
-            <a:ext cx="475615" cy="349885"/>
-          </a:xfrm>
-          <a:prstGeom prst="rect"/>
-          <a:noFill/>
+            <a:off x="1230630" y="2834005"/>
+            <a:ext cx="4148455" cy="2070735"/>
+          </a:xfrm>
+          <a:prstGeom prst="roundRect"/>
+          <a:solidFill>
+            <a:srgbClr val="EDEDED"/>
+          </a:solidFill>
         </p:spPr>
       </p:pic>
-      <p:pic>
-        <p:nvPicPr>
-          <p:cNvPr id="1114" name="그림 26"/>
-          <p:cNvPicPr>
-            <a:picLocks noChangeAspect="1"/>
-          </p:cNvPicPr>
-          <p:nvPr/>
-        </p:nvPicPr>
-        <p:blipFill rotWithShape="1">
-          <a:blip r:embed="rId4" cstate="print">
-            <a:extLst>
-              <a:ext uri="{28A0092B-C50C-407E-A947-70E740481C1C}">
-                <a14:useLocalDpi xmlns:a14="http://schemas.microsoft.com/office/drawing/2010/main" val="0"/>
-              </a:ext>
-            </a:extLst>
-          </a:blip>
-          <a:stretch>
-            <a:fillRect/>
-          </a:stretch>
-        </p:blipFill>
-        <p:spPr>
-          <a:xfrm rot="0">
-            <a:off x="2015490" y="4843145"/>
-            <a:ext cx="475615" cy="349885"/>
-          </a:xfrm>
-          <a:prstGeom prst="rect"/>
-          <a:noFill/>
-        </p:spPr>
-      </p:pic>
-      <p:pic>
-        <p:nvPicPr>
-          <p:cNvPr id="1115" name="그림 27"/>
-          <p:cNvPicPr>
-            <a:picLocks noChangeAspect="1"/>
-          </p:cNvPicPr>
-          <p:nvPr/>
-        </p:nvPicPr>
-        <p:blipFill rotWithShape="1">
-          <a:blip r:embed="rId5" cstate="print">
-            <a:extLst>
-              <a:ext uri="{28A0092B-C50C-407E-A947-70E740481C1C}">
-                <a14:useLocalDpi xmlns:a14="http://schemas.microsoft.com/office/drawing/2010/main" val="0"/>
-              </a:ext>
-            </a:extLst>
-          </a:blip>
-          <a:stretch>
-            <a:fillRect/>
-          </a:stretch>
-        </p:blipFill>
-        <p:spPr>
-          <a:xfrm rot="0">
-            <a:off x="1521460" y="5147945"/>
-            <a:ext cx="475615" cy="349885"/>
-          </a:xfrm>
-          <a:prstGeom prst="rect"/>
-          <a:noFill/>
-        </p:spPr>
-      </p:pic>
-      <p:pic>
-        <p:nvPicPr>
-          <p:cNvPr id="1116" name="그림 28"/>
-          <p:cNvPicPr>
-            <a:picLocks noChangeAspect="1"/>
-          </p:cNvPicPr>
-          <p:nvPr/>
-        </p:nvPicPr>
-        <p:blipFill rotWithShape="1">
-          <a:blip r:embed="rId6" cstate="print">
-            <a:extLst>
-              <a:ext uri="{28A0092B-C50C-407E-A947-70E740481C1C}">
-                <a14:useLocalDpi xmlns:a14="http://schemas.microsoft.com/office/drawing/2010/main" val="0"/>
-              </a:ext>
-            </a:extLst>
-          </a:blip>
-          <a:stretch>
-            <a:fillRect/>
-          </a:stretch>
-        </p:blipFill>
-        <p:spPr>
-          <a:xfrm rot="0">
-            <a:off x="2009140" y="5293995"/>
-            <a:ext cx="475615" cy="349885"/>
-          </a:xfrm>
-          <a:prstGeom prst="rect"/>
-          <a:noFill/>
-        </p:spPr>
-      </p:pic>
-      <p:sp>
-        <p:nvSpPr>
-          <p:cNvPr id="1117" name="도형 29"/>
-          <p:cNvSpPr>
-            <a:spLocks/>
-          </p:cNvSpPr>
-          <p:nvPr/>
-        </p:nvSpPr>
-        <p:spPr>
-          <a:xfrm rot="0">
-            <a:off x="1978660" y="4231005"/>
-            <a:ext cx="2951480" cy="532765"/>
-          </a:xfrm>
-          <a:prstGeom prst="curvedDownArrow"/>
-        </p:spPr>
-        <p:style>
-          <a:lnRef idx="2">
-            <a:schemeClr val="accent1">
-              <a:shade val="50000"/>
-            </a:schemeClr>
-          </a:lnRef>
-          <a:fillRef idx="1">
-            <a:schemeClr val="accent1"/>
-          </a:fillRef>
-          <a:effectRef idx="0">
-            <a:schemeClr val="accent1"/>
-          </a:effectRef>
-          <a:fontRef idx="minor">
-            <a:schemeClr val="lt1"/>
-          </a:fontRef>
-        </p:style>
-        <p:txBody>
-          <a:bodyPr wrap="square" lIns="91440" tIns="45720" rIns="91440" bIns="45720" vert="horz" anchor="ctr">
-            <a:noAutofit/>
-          </a:bodyPr>
-          <a:lstStyle/>
-          <a:p>
-            <a:pPr marL="0" indent="0" algn="ctr" hangingPunct="1"/>
-            <a:endParaRPr lang="ko-KR" altLang="en-US" sz="1800">
-              <a:latin typeface="맑은 고딕" charset="0"/>
-              <a:ea typeface="맑은 고딕" charset="0"/>
-            </a:endParaRPr>
-          </a:p>
-        </p:txBody>
-      </p:sp>
-      <p:pic>
-        <p:nvPicPr>
-          <p:cNvPr id="1118" name="그림 30"/>
-          <p:cNvPicPr>
-            <a:picLocks noChangeAspect="1"/>
-          </p:cNvPicPr>
-          <p:nvPr/>
-        </p:nvPicPr>
-        <p:blipFill rotWithShape="1">
-          <a:blip r:embed="rId7" cstate="print">
-            <a:extLst>
-              <a:ext uri="{28A0092B-C50C-407E-A947-70E740481C1C}">
-                <a14:useLocalDpi xmlns:a14="http://schemas.microsoft.com/office/drawing/2010/main" val="0"/>
-              </a:ext>
-            </a:extLst>
-          </a:blip>
-          <a:stretch>
-            <a:fillRect/>
-          </a:stretch>
-        </p:blipFill>
-        <p:spPr>
-          <a:xfrm rot="0">
-            <a:off x="4356735" y="5055870"/>
-            <a:ext cx="475615" cy="349885"/>
-          </a:xfrm>
-          <a:prstGeom prst="rect"/>
-          <a:noFill/>
-        </p:spPr>
-      </p:pic>
-      <p:pic>
-        <p:nvPicPr>
-          <p:cNvPr id="1119" name="그림 31"/>
-          <p:cNvPicPr>
-            <a:picLocks noChangeAspect="1"/>
-          </p:cNvPicPr>
-          <p:nvPr/>
-        </p:nvPicPr>
-        <p:blipFill rotWithShape="1">
-          <a:blip r:embed="rId8" cstate="print">
-            <a:extLst>
-              <a:ext uri="{28A0092B-C50C-407E-A947-70E740481C1C}">
-                <a14:useLocalDpi xmlns:a14="http://schemas.microsoft.com/office/drawing/2010/main" val="0"/>
-              </a:ext>
-            </a:extLst>
-          </a:blip>
-          <a:stretch>
-            <a:fillRect/>
-          </a:stretch>
-        </p:blipFill>
-        <p:spPr>
-          <a:xfrm rot="0">
-            <a:off x="4827270" y="5401945"/>
-            <a:ext cx="475615" cy="349885"/>
-          </a:xfrm>
-          <a:prstGeom prst="rect"/>
-          <a:noFill/>
-        </p:spPr>
-      </p:pic>
-      <p:pic>
-        <p:nvPicPr>
-          <p:cNvPr id="1120" name="그림 32"/>
-          <p:cNvPicPr>
-            <a:picLocks noChangeAspect="1"/>
-          </p:cNvPicPr>
-          <p:nvPr/>
-        </p:nvPicPr>
-        <p:blipFill rotWithShape="1">
-          <a:blip r:embed="rId9" cstate="print">
-            <a:extLst>
-              <a:ext uri="{28A0092B-C50C-407E-A947-70E740481C1C}">
-                <a14:useLocalDpi xmlns:a14="http://schemas.microsoft.com/office/drawing/2010/main" val="0"/>
-              </a:ext>
-            </a:extLst>
-          </a:blip>
-          <a:stretch>
-            <a:fillRect/>
-          </a:stretch>
-        </p:blipFill>
-        <p:spPr>
-          <a:xfrm rot="0">
-            <a:off x="4949190" y="4916805"/>
-            <a:ext cx="475615" cy="349885"/>
-          </a:xfrm>
-          <a:prstGeom prst="rect"/>
-          <a:noFill/>
-        </p:spPr>
-      </p:pic>
-      <p:sp>
-        <p:nvSpPr>
-          <p:cNvPr id="1121" name="도형 33"/>
-          <p:cNvSpPr>
-            <a:spLocks/>
-          </p:cNvSpPr>
-          <p:nvPr/>
-        </p:nvSpPr>
-        <p:spPr>
-          <a:xfrm rot="0" flipH="1" flipV="1">
-            <a:off x="1884045" y="5616575"/>
-            <a:ext cx="2951480" cy="532765"/>
-          </a:xfrm>
-          <a:prstGeom prst="curvedDownArrow"/>
-        </p:spPr>
-        <p:style>
-          <a:lnRef idx="2">
-            <a:schemeClr val="accent1">
-              <a:shade val="50000"/>
-            </a:schemeClr>
-          </a:lnRef>
-          <a:fillRef idx="1">
-            <a:schemeClr val="accent1"/>
-          </a:fillRef>
-          <a:effectRef idx="0">
-            <a:schemeClr val="accent1"/>
-          </a:effectRef>
-          <a:fontRef idx="minor">
-            <a:schemeClr val="lt1"/>
-          </a:fontRef>
-        </p:style>
-        <p:txBody>
-          <a:bodyPr wrap="square" lIns="91440" tIns="45720" rIns="91440" bIns="45720" vert="horz" anchor="ctr">
-            <a:noAutofit/>
-          </a:bodyPr>
-          <a:lstStyle/>
-          <a:p>
-            <a:pPr marL="0" indent="0" algn="ctr" hangingPunct="1"/>
-            <a:endParaRPr lang="ko-KR" altLang="en-US" sz="1800">
-              <a:latin typeface="맑은 고딕" charset="0"/>
-              <a:ea typeface="맑은 고딕" charset="0"/>
-            </a:endParaRPr>
-          </a:p>
-        </p:txBody>
-      </p:sp>
     </p:spTree>
   </p:cSld>
   <p:clrMapOvr>

</xml_diff>